<commit_message>
updated the lessons learned
</commit_message>
<xml_diff>
--- a/BDS(M)-Abschlusspraesentation.pptx
+++ b/BDS(M)-Abschlusspraesentation.pptx
@@ -828,10 +828,262 @@
               <a:buNone/>
             </a:pPr>
             <a:r>
-              <a:rPr lang="de"/>
+              <a:rPr lang="de-AT" dirty="0"/>
               <a:t>Jakob</a:t>
             </a:r>
-            <a:endParaRPr/>
+            <a:endParaRPr dirty="0"/>
+          </a:p>
+        </p:txBody>
+      </p:sp>
+    </p:spTree>
+  </p:cSld>
+  <p:clrMapOvr>
+    <a:masterClrMapping/>
+  </p:clrMapOvr>
+</p:notes>
+</file>
+
+<file path=ppt/notesSlides/notesSlide10.xml><?xml version="1.0" encoding="utf-8"?>
+<p:notes xmlns:a="http://schemas.openxmlformats.org/drawingml/2006/main" xmlns:r="http://schemas.openxmlformats.org/officeDocument/2006/relationships" xmlns:p="http://schemas.openxmlformats.org/presentationml/2006/main">
+  <p:cSld>
+    <p:spTree>
+      <p:nvGrpSpPr>
+        <p:cNvPr id="1" name=""/>
+        <p:cNvGrpSpPr/>
+        <p:nvPr/>
+      </p:nvGrpSpPr>
+      <p:grpSpPr>
+        <a:xfrm>
+          <a:off x="0" y="0"/>
+          <a:ext cx="0" cy="0"/>
+          <a:chOff x="0" y="0"/>
+          <a:chExt cx="0" cy="0"/>
+        </a:xfrm>
+      </p:grpSpPr>
+      <p:sp>
+        <p:nvSpPr>
+          <p:cNvPr id="2" name="Folienbildplatzhalter 1"/>
+          <p:cNvSpPr>
+            <a:spLocks noGrp="1" noRot="1" noChangeAspect="1"/>
+          </p:cNvSpPr>
+          <p:nvPr>
+            <p:ph type="sldImg"/>
+          </p:nvPr>
+        </p:nvSpPr>
+        <p:spPr>
+          <a:xfrm>
+            <a:off x="381000" y="685800"/>
+            <a:ext cx="6096000" cy="3429000"/>
+          </a:xfrm>
+        </p:spPr>
+      </p:sp>
+      <p:sp>
+        <p:nvSpPr>
+          <p:cNvPr id="3" name="Notizenplatzhalter 2"/>
+          <p:cNvSpPr>
+            <a:spLocks noGrp="1"/>
+          </p:cNvSpPr>
+          <p:nvPr>
+            <p:ph type="body" idx="1"/>
+          </p:nvPr>
+        </p:nvSpPr>
+        <p:spPr/>
+        <p:txBody>
+          <a:bodyPr/>
+          <a:lstStyle/>
+          <a:p>
+            <a:pPr marL="158750" indent="0">
+              <a:buNone/>
+            </a:pPr>
+            <a:r>
+              <a:rPr lang="de-AT" dirty="0"/>
+              <a:t>Jakob zeigt es her. Paul unterstützt</a:t>
+            </a:r>
+          </a:p>
+        </p:txBody>
+      </p:sp>
+    </p:spTree>
+    <p:extLst>
+      <p:ext uri="{BB962C8B-B14F-4D97-AF65-F5344CB8AC3E}">
+        <p14:creationId xmlns:p14="http://schemas.microsoft.com/office/powerpoint/2010/main" val="3954779387"/>
+      </p:ext>
+    </p:extLst>
+  </p:cSld>
+  <p:clrMapOvr>
+    <a:masterClrMapping/>
+  </p:clrMapOvr>
+</p:notes>
+</file>
+
+<file path=ppt/notesSlides/notesSlide11.xml><?xml version="1.0" encoding="utf-8"?>
+<p:notes xmlns:a="http://schemas.openxmlformats.org/drawingml/2006/main" xmlns:r="http://schemas.openxmlformats.org/officeDocument/2006/relationships" xmlns:p="http://schemas.openxmlformats.org/presentationml/2006/main">
+  <p:cSld>
+    <p:spTree>
+      <p:nvGrpSpPr>
+        <p:cNvPr id="1" name=""/>
+        <p:cNvGrpSpPr/>
+        <p:nvPr/>
+      </p:nvGrpSpPr>
+      <p:grpSpPr>
+        <a:xfrm>
+          <a:off x="0" y="0"/>
+          <a:ext cx="0" cy="0"/>
+          <a:chOff x="0" y="0"/>
+          <a:chExt cx="0" cy="0"/>
+        </a:xfrm>
+      </p:grpSpPr>
+      <p:sp>
+        <p:nvSpPr>
+          <p:cNvPr id="2" name="Folienbildplatzhalter 1"/>
+          <p:cNvSpPr>
+            <a:spLocks noGrp="1" noRot="1" noChangeAspect="1"/>
+          </p:cNvSpPr>
+          <p:nvPr>
+            <p:ph type="sldImg"/>
+          </p:nvPr>
+        </p:nvSpPr>
+        <p:spPr>
+          <a:xfrm>
+            <a:off x="381000" y="685800"/>
+            <a:ext cx="6096000" cy="3429000"/>
+          </a:xfrm>
+        </p:spPr>
+      </p:sp>
+      <p:sp>
+        <p:nvSpPr>
+          <p:cNvPr id="3" name="Notizenplatzhalter 2"/>
+          <p:cNvSpPr>
+            <a:spLocks noGrp="1"/>
+          </p:cNvSpPr>
+          <p:nvPr>
+            <p:ph type="body" idx="1"/>
+          </p:nvPr>
+        </p:nvSpPr>
+        <p:spPr/>
+        <p:txBody>
+          <a:bodyPr/>
+          <a:lstStyle/>
+          <a:p>
+            <a:pPr marL="158750" indent="0">
+              <a:buNone/>
+            </a:pPr>
+            <a:r>
+              <a:rPr lang="de-AT" dirty="0"/>
+              <a:t>Jakob</a:t>
+            </a:r>
+          </a:p>
+        </p:txBody>
+      </p:sp>
+    </p:spTree>
+    <p:extLst>
+      <p:ext uri="{BB962C8B-B14F-4D97-AF65-F5344CB8AC3E}">
+        <p14:creationId xmlns:p14="http://schemas.microsoft.com/office/powerpoint/2010/main" val="380096175"/>
+      </p:ext>
+    </p:extLst>
+  </p:cSld>
+  <p:clrMapOvr>
+    <a:masterClrMapping/>
+  </p:clrMapOvr>
+</p:notes>
+</file>
+
+<file path=ppt/notesSlides/notesSlide12.xml><?xml version="1.0" encoding="utf-8"?>
+<p:notes xmlns:a="http://schemas.openxmlformats.org/drawingml/2006/main" xmlns:r="http://schemas.openxmlformats.org/officeDocument/2006/relationships" xmlns:p="http://schemas.openxmlformats.org/presentationml/2006/main" showMasterSp="0" showMasterPhAnim="0">
+  <p:cSld>
+    <p:spTree>
+      <p:nvGrpSpPr>
+        <p:cNvPr id="1" name="Shape 117"/>
+        <p:cNvGrpSpPr/>
+        <p:nvPr/>
+      </p:nvGrpSpPr>
+      <p:grpSpPr>
+        <a:xfrm>
+          <a:off x="0" y="0"/>
+          <a:ext cx="0" cy="0"/>
+          <a:chOff x="0" y="0"/>
+          <a:chExt cx="0" cy="0"/>
+        </a:xfrm>
+      </p:grpSpPr>
+      <p:sp>
+        <p:nvSpPr>
+          <p:cNvPr id="118" name="Google Shape;118;g8045b43f82_2_1009:notes"/>
+          <p:cNvSpPr>
+            <a:spLocks noGrp="1" noRot="1" noChangeAspect="1"/>
+          </p:cNvSpPr>
+          <p:nvPr>
+            <p:ph type="sldImg" idx="2"/>
+          </p:nvPr>
+        </p:nvSpPr>
+        <p:spPr>
+          <a:xfrm>
+            <a:off x="381000" y="685800"/>
+            <a:ext cx="6096000" cy="3429000"/>
+          </a:xfrm>
+          <a:custGeom>
+            <a:avLst/>
+            <a:gdLst/>
+            <a:ahLst/>
+            <a:cxnLst/>
+            <a:rect l="l" t="t" r="r" b="b"/>
+            <a:pathLst>
+              <a:path w="120000" h="120000" extrusionOk="0">
+                <a:moveTo>
+                  <a:pt x="0" y="0"/>
+                </a:moveTo>
+                <a:lnTo>
+                  <a:pt x="120000" y="0"/>
+                </a:lnTo>
+                <a:lnTo>
+                  <a:pt x="120000" y="120000"/>
+                </a:lnTo>
+                <a:lnTo>
+                  <a:pt x="0" y="120000"/>
+                </a:lnTo>
+                <a:close/>
+              </a:path>
+            </a:pathLst>
+          </a:custGeom>
+        </p:spPr>
+      </p:sp>
+      <p:sp>
+        <p:nvSpPr>
+          <p:cNvPr id="119" name="Google Shape;119;g8045b43f82_2_1009:notes"/>
+          <p:cNvSpPr txBox="1">
+            <a:spLocks noGrp="1"/>
+          </p:cNvSpPr>
+          <p:nvPr>
+            <p:ph type="body" idx="1"/>
+          </p:nvPr>
+        </p:nvSpPr>
+        <p:spPr>
+          <a:xfrm>
+            <a:off x="685800" y="4343400"/>
+            <a:ext cx="5486400" cy="4114800"/>
+          </a:xfrm>
+          <a:prstGeom prst="rect">
+            <a:avLst/>
+          </a:prstGeom>
+        </p:spPr>
+        <p:txBody>
+          <a:bodyPr spcFirstLastPara="1" wrap="square" lIns="91425" tIns="91425" rIns="91425" bIns="91425" anchor="t" anchorCtr="0">
+            <a:noAutofit/>
+          </a:bodyPr>
+          <a:lstStyle/>
+          <a:p>
+            <a:pPr marL="0" lvl="0" indent="0" algn="l" rtl="0">
+              <a:spcBef>
+                <a:spcPts val="0"/>
+              </a:spcBef>
+              <a:spcAft>
+                <a:spcPts val="0"/>
+              </a:spcAft>
+              <a:buNone/>
+            </a:pPr>
+            <a:r>
+              <a:rPr lang="de-AT" dirty="0"/>
+              <a:t>Jakob</a:t>
+            </a:r>
+            <a:endParaRPr dirty="0"/>
           </a:p>
         </p:txBody>
       </p:sp>
@@ -936,10 +1188,10 @@
               <a:buNone/>
             </a:pPr>
             <a:r>
-              <a:rPr lang="de"/>
+              <a:rPr lang="de-AT" dirty="0"/>
               <a:t>Jakob</a:t>
             </a:r>
-            <a:endParaRPr/>
+            <a:endParaRPr dirty="0"/>
           </a:p>
         </p:txBody>
       </p:sp>
@@ -1044,10 +1296,10 @@
               <a:buNone/>
             </a:pPr>
             <a:r>
-              <a:rPr lang="de"/>
+              <a:rPr lang="de-AT" dirty="0"/>
               <a:t>Jakob</a:t>
             </a:r>
-            <a:endParaRPr/>
+            <a:endParaRPr dirty="0"/>
           </a:p>
         </p:txBody>
       </p:sp>
@@ -1152,10 +1404,10 @@
               <a:buNone/>
             </a:pPr>
             <a:r>
-              <a:rPr lang="de"/>
+              <a:rPr lang="de-AT" dirty="0"/>
               <a:t>Jakob</a:t>
             </a:r>
-            <a:endParaRPr/>
+            <a:endParaRPr dirty="0"/>
           </a:p>
         </p:txBody>
       </p:sp>
@@ -1216,9 +1468,12 @@
           <a:bodyPr/>
           <a:lstStyle/>
           <a:p>
+            <a:pPr marL="158750" indent="0">
+              <a:buNone/>
+            </a:pPr>
             <a:r>
               <a:rPr lang="de-AT" dirty="0"/>
-              <a:t>Ivonne</a:t>
+              <a:t>Paul</a:t>
             </a:r>
           </a:p>
         </p:txBody>
@@ -1329,10 +1584,10 @@
               <a:buNone/>
             </a:pPr>
             <a:r>
-              <a:rPr lang="de"/>
+              <a:rPr lang="de-AT" dirty="0"/>
               <a:t>Paul</a:t>
             </a:r>
-            <a:endParaRPr/>
+            <a:endParaRPr dirty="0"/>
           </a:p>
         </p:txBody>
       </p:sp>
@@ -1398,6 +1653,159 @@
             </a:pPr>
             <a:r>
               <a:rPr lang="de-AT" dirty="0"/>
+              <a:t>Paul</a:t>
+            </a:r>
+          </a:p>
+        </p:txBody>
+      </p:sp>
+    </p:spTree>
+    <p:extLst>
+      <p:ext uri="{BB962C8B-B14F-4D97-AF65-F5344CB8AC3E}">
+        <p14:creationId xmlns:p14="http://schemas.microsoft.com/office/powerpoint/2010/main" val="2253668169"/>
+      </p:ext>
+    </p:extLst>
+  </p:cSld>
+  <p:clrMapOvr>
+    <a:masterClrMapping/>
+  </p:clrMapOvr>
+</p:notes>
+</file>
+
+<file path=ppt/notesSlides/notesSlide8.xml><?xml version="1.0" encoding="utf-8"?>
+<p:notes xmlns:a="http://schemas.openxmlformats.org/drawingml/2006/main" xmlns:r="http://schemas.openxmlformats.org/officeDocument/2006/relationships" xmlns:p="http://schemas.openxmlformats.org/presentationml/2006/main">
+  <p:cSld>
+    <p:spTree>
+      <p:nvGrpSpPr>
+        <p:cNvPr id="1" name=""/>
+        <p:cNvGrpSpPr/>
+        <p:nvPr/>
+      </p:nvGrpSpPr>
+      <p:grpSpPr>
+        <a:xfrm>
+          <a:off x="0" y="0"/>
+          <a:ext cx="0" cy="0"/>
+          <a:chOff x="0" y="0"/>
+          <a:chExt cx="0" cy="0"/>
+        </a:xfrm>
+      </p:grpSpPr>
+      <p:sp>
+        <p:nvSpPr>
+          <p:cNvPr id="2" name="Folienbildplatzhalter 1"/>
+          <p:cNvSpPr>
+            <a:spLocks noGrp="1" noRot="1" noChangeAspect="1"/>
+          </p:cNvSpPr>
+          <p:nvPr>
+            <p:ph type="sldImg"/>
+          </p:nvPr>
+        </p:nvSpPr>
+        <p:spPr>
+          <a:xfrm>
+            <a:off x="381000" y="685800"/>
+            <a:ext cx="6096000" cy="3429000"/>
+          </a:xfrm>
+        </p:spPr>
+      </p:sp>
+      <p:sp>
+        <p:nvSpPr>
+          <p:cNvPr id="3" name="Notizenplatzhalter 2"/>
+          <p:cNvSpPr>
+            <a:spLocks noGrp="1"/>
+          </p:cNvSpPr>
+          <p:nvPr>
+            <p:ph type="body" idx="1"/>
+          </p:nvPr>
+        </p:nvSpPr>
+        <p:spPr/>
+        <p:txBody>
+          <a:bodyPr/>
+          <a:lstStyle/>
+          <a:p>
+            <a:pPr marL="158750" indent="0">
+              <a:buNone/>
+            </a:pPr>
+            <a:r>
+              <a:rPr lang="de-AT" dirty="0"/>
+              <a:t>Paul</a:t>
+            </a:r>
+          </a:p>
+        </p:txBody>
+      </p:sp>
+    </p:spTree>
+    <p:extLst>
+      <p:ext uri="{BB962C8B-B14F-4D97-AF65-F5344CB8AC3E}">
+        <p14:creationId xmlns:p14="http://schemas.microsoft.com/office/powerpoint/2010/main" val="1041544740"/>
+      </p:ext>
+    </p:extLst>
+  </p:cSld>
+  <p:clrMapOvr>
+    <a:masterClrMapping/>
+  </p:clrMapOvr>
+</p:notes>
+</file>
+
+<file path=ppt/notesSlides/notesSlide9.xml><?xml version="1.0" encoding="utf-8"?>
+<p:notes xmlns:a="http://schemas.openxmlformats.org/drawingml/2006/main" xmlns:r="http://schemas.openxmlformats.org/officeDocument/2006/relationships" xmlns:p="http://schemas.openxmlformats.org/presentationml/2006/main">
+  <p:cSld>
+    <p:spTree>
+      <p:nvGrpSpPr>
+        <p:cNvPr id="1" name=""/>
+        <p:cNvGrpSpPr/>
+        <p:nvPr/>
+      </p:nvGrpSpPr>
+      <p:grpSpPr>
+        <a:xfrm>
+          <a:off x="0" y="0"/>
+          <a:ext cx="0" cy="0"/>
+          <a:chOff x="0" y="0"/>
+          <a:chExt cx="0" cy="0"/>
+        </a:xfrm>
+      </p:grpSpPr>
+      <p:sp>
+        <p:nvSpPr>
+          <p:cNvPr id="2" name="Folienbildplatzhalter 1"/>
+          <p:cNvSpPr>
+            <a:spLocks noGrp="1" noRot="1" noChangeAspect="1"/>
+          </p:cNvSpPr>
+          <p:nvPr>
+            <p:ph type="sldImg"/>
+          </p:nvPr>
+        </p:nvSpPr>
+        <p:spPr>
+          <a:xfrm>
+            <a:off x="381000" y="685800"/>
+            <a:ext cx="6096000" cy="3429000"/>
+          </a:xfrm>
+        </p:spPr>
+      </p:sp>
+      <p:sp>
+        <p:nvSpPr>
+          <p:cNvPr id="3" name="Notizenplatzhalter 2"/>
+          <p:cNvSpPr>
+            <a:spLocks noGrp="1"/>
+          </p:cNvSpPr>
+          <p:nvPr>
+            <p:ph type="body" idx="1"/>
+          </p:nvPr>
+        </p:nvSpPr>
+        <p:spPr/>
+        <p:txBody>
+          <a:bodyPr/>
+          <a:lstStyle/>
+          <a:p>
+            <a:pPr marL="158750" indent="0">
+              <a:buNone/>
+            </a:pPr>
+            <a:r>
+              <a:rPr lang="de-AT" dirty="0"/>
+              <a:t>Paul</a:t>
+            </a:r>
+          </a:p>
+          <a:p>
+            <a:pPr marL="158750" indent="0">
+              <a:buNone/>
+            </a:pPr>
+            <a:r>
+              <a:rPr lang="de-AT" dirty="0"/>
               <a:t>Alle wurden generell wegen ihrer Skalierbarkeit verwendet. </a:t>
             </a:r>
             <a:r>
@@ -1430,114 +1838,6 @@
         <p14:creationId xmlns:p14="http://schemas.microsoft.com/office/powerpoint/2010/main" val="3695717745"/>
       </p:ext>
     </p:extLst>
-  </p:cSld>
-  <p:clrMapOvr>
-    <a:masterClrMapping/>
-  </p:clrMapOvr>
-</p:notes>
-</file>
-
-<file path=ppt/notesSlides/notesSlide8.xml><?xml version="1.0" encoding="utf-8"?>
-<p:notes xmlns:a="http://schemas.openxmlformats.org/drawingml/2006/main" xmlns:r="http://schemas.openxmlformats.org/officeDocument/2006/relationships" xmlns:p="http://schemas.openxmlformats.org/presentationml/2006/main" showMasterSp="0" showMasterPhAnim="0">
-  <p:cSld>
-    <p:spTree>
-      <p:nvGrpSpPr>
-        <p:cNvPr id="1" name="Shape 117"/>
-        <p:cNvGrpSpPr/>
-        <p:nvPr/>
-      </p:nvGrpSpPr>
-      <p:grpSpPr>
-        <a:xfrm>
-          <a:off x="0" y="0"/>
-          <a:ext cx="0" cy="0"/>
-          <a:chOff x="0" y="0"/>
-          <a:chExt cx="0" cy="0"/>
-        </a:xfrm>
-      </p:grpSpPr>
-      <p:sp>
-        <p:nvSpPr>
-          <p:cNvPr id="118" name="Google Shape;118;g8045b43f82_2_1009:notes"/>
-          <p:cNvSpPr>
-            <a:spLocks noGrp="1" noRot="1" noChangeAspect="1"/>
-          </p:cNvSpPr>
-          <p:nvPr>
-            <p:ph type="sldImg" idx="2"/>
-          </p:nvPr>
-        </p:nvSpPr>
-        <p:spPr>
-          <a:xfrm>
-            <a:off x="381000" y="685800"/>
-            <a:ext cx="6096000" cy="3429000"/>
-          </a:xfrm>
-          <a:custGeom>
-            <a:avLst/>
-            <a:gdLst/>
-            <a:ahLst/>
-            <a:cxnLst/>
-            <a:rect l="l" t="t" r="r" b="b"/>
-            <a:pathLst>
-              <a:path w="120000" h="120000" extrusionOk="0">
-                <a:moveTo>
-                  <a:pt x="0" y="0"/>
-                </a:moveTo>
-                <a:lnTo>
-                  <a:pt x="120000" y="0"/>
-                </a:lnTo>
-                <a:lnTo>
-                  <a:pt x="120000" y="120000"/>
-                </a:lnTo>
-                <a:lnTo>
-                  <a:pt x="0" y="120000"/>
-                </a:lnTo>
-                <a:close/>
-              </a:path>
-            </a:pathLst>
-          </a:custGeom>
-        </p:spPr>
-      </p:sp>
-      <p:sp>
-        <p:nvSpPr>
-          <p:cNvPr id="119" name="Google Shape;119;g8045b43f82_2_1009:notes"/>
-          <p:cNvSpPr txBox="1">
-            <a:spLocks noGrp="1"/>
-          </p:cNvSpPr>
-          <p:nvPr>
-            <p:ph type="body" idx="1"/>
-          </p:nvPr>
-        </p:nvSpPr>
-        <p:spPr>
-          <a:xfrm>
-            <a:off x="685800" y="4343400"/>
-            <a:ext cx="5486400" cy="4114800"/>
-          </a:xfrm>
-          <a:prstGeom prst="rect">
-            <a:avLst/>
-          </a:prstGeom>
-        </p:spPr>
-        <p:txBody>
-          <a:bodyPr spcFirstLastPara="1" wrap="square" lIns="91425" tIns="91425" rIns="91425" bIns="91425" anchor="t" anchorCtr="0">
-            <a:noAutofit/>
-          </a:bodyPr>
-          <a:lstStyle/>
-          <a:p>
-            <a:pPr marL="0" lvl="0" indent="0" algn="l" rtl="0">
-              <a:spcBef>
-                <a:spcPts val="0"/>
-              </a:spcBef>
-              <a:spcAft>
-                <a:spcPts val="0"/>
-              </a:spcAft>
-              <a:buNone/>
-            </a:pPr>
-            <a:r>
-              <a:rPr lang="de"/>
-              <a:t>Ivonne</a:t>
-            </a:r>
-            <a:endParaRPr/>
-          </a:p>
-        </p:txBody>
-      </p:sp>
-    </p:spTree>
   </p:cSld>
   <p:clrMapOvr>
     <a:masterClrMapping/>
@@ -7529,7 +7829,7 @@
           <p:nvPr/>
         </p:nvPicPr>
         <p:blipFill>
-          <a:blip r:embed="rId2"/>
+          <a:blip r:embed="rId3"/>
           <a:stretch>
             <a:fillRect/>
           </a:stretch>
@@ -7559,7 +7859,7 @@
           <p:nvPr/>
         </p:nvPicPr>
         <p:blipFill>
-          <a:blip r:embed="rId3"/>
+          <a:blip r:embed="rId4"/>
           <a:stretch>
             <a:fillRect/>
           </a:stretch>
@@ -7589,7 +7889,7 @@
           <p:nvPr/>
         </p:nvPicPr>
         <p:blipFill>
-          <a:blip r:embed="rId4"/>
+          <a:blip r:embed="rId5"/>
           <a:stretch>
             <a:fillRect/>
           </a:stretch>
@@ -7619,7 +7919,7 @@
           <p:nvPr/>
         </p:nvPicPr>
         <p:blipFill rotWithShape="1">
-          <a:blip r:embed="rId5"/>
+          <a:blip r:embed="rId6"/>
           <a:srcRect l="1086" t="15176" b="10249"/>
           <a:stretch/>
         </p:blipFill>
@@ -7648,7 +7948,7 @@
           <p:nvPr/>
         </p:nvPicPr>
         <p:blipFill>
-          <a:blip r:embed="rId6"/>
+          <a:blip r:embed="rId7"/>
           <a:stretch>
             <a:fillRect/>
           </a:stretch>
@@ -8055,8 +8355,8 @@
         </p:nvSpPr>
         <p:spPr>
           <a:xfrm>
-            <a:off x="311700" y="1225225"/>
-            <a:ext cx="8520600" cy="3354000"/>
+            <a:off x="311700" y="1437326"/>
+            <a:ext cx="8520600" cy="3125245"/>
           </a:xfrm>
           <a:prstGeom prst="rect">
             <a:avLst/>
@@ -8322,6 +8622,9 @@
               <a:lnSpc>
                 <a:spcPct val="200000"/>
               </a:lnSpc>
+              <a:spcAft>
+                <a:spcPts val="1200"/>
+              </a:spcAft>
               <a:buChar char="❖"/>
             </a:pPr>
             <a:r>
@@ -8335,6 +8638,9 @@
               <a:lnSpc>
                 <a:spcPct val="200000"/>
               </a:lnSpc>
+              <a:spcAft>
+                <a:spcPts val="1200"/>
+              </a:spcAft>
               <a:buChar char="❖"/>
             </a:pPr>
             <a:r>
@@ -8353,19 +8659,14 @@
               <a:lnSpc>
                 <a:spcPct val="200000"/>
               </a:lnSpc>
+              <a:spcAft>
+                <a:spcPts val="1200"/>
+              </a:spcAft>
               <a:buChar char="❖"/>
             </a:pPr>
             <a:r>
               <a:rPr lang="de-AT" dirty="0"/>
-              <a:t>Spark </a:t>
-            </a:r>
-            <a:r>
-              <a:rPr lang="de-AT" dirty="0" err="1"/>
-              <a:t>Queries</a:t>
-            </a:r>
-            <a:r>
-              <a:rPr lang="de-AT" dirty="0"/>
-              <a:t> auf HDFS</a:t>
+              <a:t>Abspeicherung der Daten in HDFS</a:t>
             </a:r>
           </a:p>
           <a:p>
@@ -8373,62 +8674,35 @@
               <a:lnSpc>
                 <a:spcPct val="200000"/>
               </a:lnSpc>
+              <a:spcAft>
+                <a:spcPts val="1200"/>
+              </a:spcAft>
               <a:buChar char="❖"/>
             </a:pPr>
             <a:r>
               <a:rPr lang="de-AT" dirty="0"/>
-              <a:t>Zeit für das Projekt finden (zusätzlich zu </a:t>
-            </a:r>
-            <a:br>
-              <a:rPr lang="de-AT" dirty="0"/>
-            </a:br>
-            <a:r>
-              <a:rPr lang="de-AT" dirty="0"/>
-              <a:t>den anderen drei Projekten anderer </a:t>
+              <a:t>All-in-</a:t>
             </a:r>
             <a:r>
               <a:rPr lang="de-AT" dirty="0" err="1"/>
-              <a:t>Lv‘s</a:t>
+              <a:t>one</a:t>
             </a:r>
             <a:r>
               <a:rPr lang="de-AT" dirty="0"/>
-              <a:t>)</a:t>
+              <a:t> </a:t>
             </a:r>
-          </a:p>
-          <a:p>
-            <a:pPr lvl="1">
-              <a:lnSpc>
-                <a:spcPct val="150000"/>
-              </a:lnSpc>
-              <a:spcBef>
-                <a:spcPts val="0"/>
-              </a:spcBef>
-              <a:buFont typeface="Wingdings" panose="05000000000000000000" pitchFamily="2" charset="2"/>
-              <a:buChar char="Ø"/>
-            </a:pPr>
-            <a:endParaRPr lang="de-AT" dirty="0"/>
-          </a:p>
-          <a:p>
-            <a:pPr>
-              <a:lnSpc>
-                <a:spcPct val="150000"/>
-              </a:lnSpc>
-              <a:buFont typeface="Wingdings" panose="05000000000000000000" pitchFamily="2" charset="2"/>
-              <a:buChar char="Ø"/>
-            </a:pPr>
-            <a:endParaRPr lang="de-AT" dirty="0"/>
-          </a:p>
-          <a:p>
-            <a:pPr lvl="1">
-              <a:lnSpc>
-                <a:spcPct val="150000"/>
-              </a:lnSpc>
-              <a:spcBef>
-                <a:spcPts val="0"/>
-              </a:spcBef>
-              <a:buFont typeface="Wingdings" panose="05000000000000000000" pitchFamily="2" charset="2"/>
-              <a:buChar char="Ø"/>
-            </a:pPr>
+            <a:r>
+              <a:rPr lang="de-AT" dirty="0" err="1"/>
+              <a:t>docker-compose</a:t>
+            </a:r>
+            <a:r>
+              <a:rPr lang="de-AT" dirty="0"/>
+              <a:t> </a:t>
+            </a:r>
+            <a:r>
+              <a:rPr lang="de-AT" dirty="0" err="1"/>
+              <a:t>file</a:t>
+            </a:r>
             <a:endParaRPr lang="de-AT" dirty="0"/>
           </a:p>
           <a:p>
@@ -8451,10 +8725,10 @@
           <p:nvPr/>
         </p:nvPicPr>
         <p:blipFill>
-          <a:blip r:embed="rId2">
+          <a:blip r:embed="rId3">
             <a:extLst>
               <a:ext uri="{96DAC541-7B7A-43D3-8B79-37D633B846F1}">
-                <asvg:svgBlip xmlns:asvg="http://schemas.microsoft.com/office/drawing/2016/SVG/main" r:embed="rId3"/>
+                <asvg:svgBlip xmlns:asvg="http://schemas.microsoft.com/office/drawing/2016/SVG/main" r:embed="rId4"/>
               </a:ext>
             </a:extLst>
           </a:blip>
@@ -8487,7 +8761,7 @@
           <p:nvPr/>
         </p:nvPicPr>
         <p:blipFill>
-          <a:blip r:embed="rId4"/>
+          <a:blip r:embed="rId5"/>
           <a:stretch>
             <a:fillRect/>
           </a:stretch>
@@ -12588,7 +12862,7 @@
           <p:nvPr/>
         </p:nvPicPr>
         <p:blipFill>
-          <a:blip r:embed="rId2">
+          <a:blip r:embed="rId3">
             <a:alphaModFix/>
           </a:blip>
           <a:stretch>
@@ -12644,7 +12918,7 @@
             <p:nvPr/>
           </p:nvPicPr>
           <p:blipFill rotWithShape="1">
-            <a:blip r:embed="rId3">
+            <a:blip r:embed="rId4">
               <a:alphaModFix/>
             </a:blip>
             <a:srcRect l="4808" t="27590" r="1452" b="26341"/>
@@ -12715,7 +12989,7 @@
           <p:nvPr/>
         </p:nvPicPr>
         <p:blipFill>
-          <a:blip r:embed="rId4"/>
+          <a:blip r:embed="rId5"/>
           <a:stretch>
             <a:fillRect/>
           </a:stretch>
@@ -13646,7 +13920,7 @@
           <p:nvPr/>
         </p:nvPicPr>
         <p:blipFill>
-          <a:blip r:embed="rId2">
+          <a:blip r:embed="rId3">
             <a:alphaModFix/>
           </a:blip>
           <a:stretch>
@@ -13682,7 +13956,7 @@
           <p:nvPr/>
         </p:nvPicPr>
         <p:blipFill rotWithShape="1">
-          <a:blip r:embed="rId3">
+          <a:blip r:embed="rId4">
             <a:alphaModFix/>
           </a:blip>
           <a:srcRect t="33979" b="33161"/>
@@ -13717,7 +13991,7 @@
           <p:nvPr/>
         </p:nvPicPr>
         <p:blipFill rotWithShape="1">
-          <a:blip r:embed="rId4"/>
+          <a:blip r:embed="rId5"/>
           <a:srcRect t="35846" b="38164"/>
           <a:stretch/>
         </p:blipFill>
@@ -13746,7 +14020,7 @@
           <p:nvPr/>
         </p:nvPicPr>
         <p:blipFill>
-          <a:blip r:embed="rId5"/>
+          <a:blip r:embed="rId6"/>
           <a:stretch>
             <a:fillRect/>
           </a:stretch>
@@ -13776,7 +14050,7 @@
           <p:nvPr/>
         </p:nvPicPr>
         <p:blipFill>
-          <a:blip r:embed="rId6"/>
+          <a:blip r:embed="rId7"/>
           <a:stretch>
             <a:fillRect/>
           </a:stretch>
@@ -13806,7 +14080,7 @@
           <p:nvPr/>
         </p:nvPicPr>
         <p:blipFill>
-          <a:blip r:embed="rId7"/>
+          <a:blip r:embed="rId8"/>
           <a:stretch>
             <a:fillRect/>
           </a:stretch>

</xml_diff>